<commit_message>
updated code fo hosting
</commit_message>
<xml_diff>
--- a/multiserviceprovider/seminar/Seminar_Presentataion.pptx
+++ b/multiserviceprovider/seminar/Seminar_Presentataion.pptx
@@ -213,7 +213,7 @@
           <a:p>
             <a:fld id="{FCE4A519-D219-47CD-911F-2958BA0A8F12}" type="datetimeFigureOut">
               <a:rPr lang="en-US" smtClean="0"/>
-              <a:t>4/15/2024</a:t>
+              <a:t>4/16/2024</a:t>
             </a:fld>
             <a:endParaRPr lang="en-US"/>
           </a:p>
@@ -1169,7 +1169,7 @@
           <a:p>
             <a:fld id="{C83D3C11-8D6A-4A5E-A65F-B60B0C0BD516}" type="datetime1">
               <a:rPr lang="en-IN" smtClean="0"/>
-              <a:t>15-04-2024</a:t>
+              <a:t>16-04-2024</a:t>
             </a:fld>
             <a:endParaRPr lang="en-IN"/>
           </a:p>
@@ -2334,7 +2334,7 @@
           <a:p>
             <a:fld id="{AD88E512-F4EC-47E3-B3ED-8960380A1970}" type="datetime1">
               <a:rPr lang="en-IN" smtClean="0"/>
-              <a:t>15-04-2024</a:t>
+              <a:t>16-04-2024</a:t>
             </a:fld>
             <a:endParaRPr lang="en-IN"/>
           </a:p>
@@ -3393,7 +3393,7 @@
           <a:p>
             <a:fld id="{AD88E512-F4EC-47E3-B3ED-8960380A1970}" type="datetime1">
               <a:rPr lang="en-IN" smtClean="0"/>
-              <a:t>15-04-2024</a:t>
+              <a:t>16-04-2024</a:t>
             </a:fld>
             <a:endParaRPr lang="en-IN"/>
           </a:p>
@@ -4611,7 +4611,7 @@
           <a:p>
             <a:fld id="{AD88E512-F4EC-47E3-B3ED-8960380A1970}" type="datetime1">
               <a:rPr lang="en-IN" smtClean="0"/>
-              <a:t>15-04-2024</a:t>
+              <a:t>16-04-2024</a:t>
             </a:fld>
             <a:endParaRPr lang="en-IN"/>
           </a:p>
@@ -5720,7 +5720,7 @@
           <a:p>
             <a:fld id="{AD88E512-F4EC-47E3-B3ED-8960380A1970}" type="datetime1">
               <a:rPr lang="en-IN" smtClean="0"/>
-              <a:t>15-04-2024</a:t>
+              <a:t>16-04-2024</a:t>
             </a:fld>
             <a:endParaRPr lang="en-IN"/>
           </a:p>
@@ -6377,7 +6377,7 @@
           <a:p>
             <a:fld id="{AD88E512-F4EC-47E3-B3ED-8960380A1970}" type="datetime1">
               <a:rPr lang="en-IN" smtClean="0"/>
-              <a:t>15-04-2024</a:t>
+              <a:t>16-04-2024</a:t>
             </a:fld>
             <a:endParaRPr lang="en-IN"/>
           </a:p>
@@ -7229,7 +7229,7 @@
           <a:p>
             <a:fld id="{AD88E512-F4EC-47E3-B3ED-8960380A1970}" type="datetime1">
               <a:rPr lang="en-IN" smtClean="0"/>
-              <a:t>15-04-2024</a:t>
+              <a:t>16-04-2024</a:t>
             </a:fld>
             <a:endParaRPr lang="en-IN"/>
           </a:p>
@@ -7419,7 +7419,7 @@
           <a:p>
             <a:fld id="{5BF13869-5C46-445F-8085-2E923E2D599C}" type="datetime1">
               <a:rPr lang="en-IN" smtClean="0"/>
-              <a:t>15-04-2024</a:t>
+              <a:t>16-04-2024</a:t>
             </a:fld>
             <a:endParaRPr lang="en-IN"/>
           </a:p>
@@ -8464,7 +8464,7 @@
           <a:p>
             <a:fld id="{99833335-9A8E-48A9-A91D-7E4040169785}" type="datetime1">
               <a:rPr lang="en-IN" smtClean="0"/>
-              <a:t>15-04-2024</a:t>
+              <a:t>16-04-2024</a:t>
             </a:fld>
             <a:endParaRPr lang="en-IN"/>
           </a:p>
@@ -8684,7 +8684,7 @@
           <a:p>
             <a:fld id="{E117E1CD-1417-48A0-8479-8AC022749A8C}" type="datetime1">
               <a:rPr lang="en-IN" smtClean="0"/>
-              <a:t>15-04-2024</a:t>
+              <a:t>16-04-2024</a:t>
             </a:fld>
             <a:endParaRPr lang="en-IN"/>
           </a:p>
@@ -9793,7 +9793,7 @@
           <a:p>
             <a:fld id="{465CCA9F-CE8B-4912-8BFD-B17889EA49A8}" type="datetime1">
               <a:rPr lang="en-IN" smtClean="0"/>
-              <a:t>15-04-2024</a:t>
+              <a:t>16-04-2024</a:t>
             </a:fld>
             <a:endParaRPr lang="en-IN"/>
           </a:p>
@@ -10069,7 +10069,7 @@
           <a:p>
             <a:fld id="{A9074CF5-D2DA-44A9-96F3-5EBB82F3E142}" type="datetime1">
               <a:rPr lang="en-IN" smtClean="0"/>
-              <a:t>15-04-2024</a:t>
+              <a:t>16-04-2024</a:t>
             </a:fld>
             <a:endParaRPr lang="en-IN"/>
           </a:p>
@@ -10455,7 +10455,7 @@
           <a:p>
             <a:fld id="{C81FC77F-65A3-4E33-995E-200854F402D9}" type="datetime1">
               <a:rPr lang="en-IN" smtClean="0"/>
-              <a:t>15-04-2024</a:t>
+              <a:t>16-04-2024</a:t>
             </a:fld>
             <a:endParaRPr lang="en-IN"/>
           </a:p>
@@ -10577,7 +10577,7 @@
           <a:p>
             <a:fld id="{D9AB53BF-8822-4DF9-B698-3877D522EDED}" type="datetime1">
               <a:rPr lang="en-IN" smtClean="0"/>
-              <a:t>15-04-2024</a:t>
+              <a:t>16-04-2024</a:t>
             </a:fld>
             <a:endParaRPr lang="en-IN"/>
           </a:p>
@@ -10676,7 +10676,7 @@
           <a:p>
             <a:fld id="{B99F1582-BA95-464A-BC50-DE90194A526F}" type="datetime1">
               <a:rPr lang="en-IN" smtClean="0"/>
-              <a:t>15-04-2024</a:t>
+              <a:t>16-04-2024</a:t>
             </a:fld>
             <a:endParaRPr lang="en-IN"/>
           </a:p>
@@ -11832,7 +11832,7 @@
           <a:p>
             <a:fld id="{E1AC9716-4236-45B2-B18B-D5CF82312283}" type="datetime1">
               <a:rPr lang="en-IN" smtClean="0"/>
-              <a:t>15-04-2024</a:t>
+              <a:t>16-04-2024</a:t>
             </a:fld>
             <a:endParaRPr lang="en-IN"/>
           </a:p>
@@ -13012,7 +13012,7 @@
           <a:p>
             <a:fld id="{837E7CE5-C7AB-4C13-891E-56D7F445F770}" type="datetime1">
               <a:rPr lang="en-IN" smtClean="0"/>
-              <a:t>15-04-2024</a:t>
+              <a:t>16-04-2024</a:t>
             </a:fld>
             <a:endParaRPr lang="en-IN"/>
           </a:p>
@@ -14126,7 +14126,7 @@
           <a:p>
             <a:fld id="{AD88E512-F4EC-47E3-B3ED-8960380A1970}" type="datetime1">
               <a:rPr lang="en-IN" smtClean="0"/>
-              <a:t>15-04-2024</a:t>
+              <a:t>16-04-2024</a:t>
             </a:fld>
             <a:endParaRPr lang="en-IN"/>
           </a:p>
@@ -15807,7 +15807,7 @@
         </p:blipFill>
         <p:spPr>
           <a:xfrm>
-            <a:off x="940094" y="2360646"/>
+            <a:off x="770070" y="1852646"/>
             <a:ext cx="7672783" cy="3596088"/>
           </a:xfrm>
           <a:prstGeom prst="rect">
@@ -15851,6 +15851,44 @@
           </a:prstGeom>
         </p:spPr>
       </p:pic>
+      <p:sp>
+        <p:nvSpPr>
+          <p:cNvPr id="3" name="TextBox 2">
+            <a:extLst>
+              <a:ext uri="{FF2B5EF4-FFF2-40B4-BE49-F238E27FC236}">
+                <a16:creationId xmlns:a16="http://schemas.microsoft.com/office/drawing/2014/main" id="{E18C51C4-9C3A-6275-807C-981F04452B66}"/>
+              </a:ext>
+            </a:extLst>
+          </p:cNvPr>
+          <p:cNvSpPr txBox="1"/>
+          <p:nvPr/>
+        </p:nvSpPr>
+        <p:spPr>
+          <a:xfrm>
+            <a:off x="3007360" y="5533885"/>
+            <a:ext cx="3859795" cy="307777"/>
+          </a:xfrm>
+          <a:prstGeom prst="rect">
+            <a:avLst/>
+          </a:prstGeom>
+          <a:noFill/>
+        </p:spPr>
+        <p:txBody>
+          <a:bodyPr wrap="square" rtlCol="0">
+            <a:spAutoFit/>
+          </a:bodyPr>
+          <a:lstStyle/>
+          <a:p>
+            <a:r>
+              <a:rPr lang="en-IN" sz="1400" dirty="0">
+                <a:latin typeface="Times New Roman" panose="02020603050405020304" pitchFamily="18" charset="0"/>
+                <a:cs typeface="Times New Roman" panose="02020603050405020304" pitchFamily="18" charset="0"/>
+              </a:rPr>
+              <a:t>Figure 3 . Project implementation</a:t>
+            </a:r>
+          </a:p>
+        </p:txBody>
+      </p:sp>
     </p:spTree>
     <p:extLst>
       <p:ext uri="{BB962C8B-B14F-4D97-AF65-F5344CB8AC3E}">
@@ -15914,42 +15952,33 @@
             <p:ph idx="1"/>
           </p:nvPr>
         </p:nvSpPr>
-        <p:spPr/>
+        <p:spPr>
+          <a:xfrm>
+            <a:off x="875035" y="2350207"/>
+            <a:ext cx="10722916" cy="3416300"/>
+          </a:xfrm>
+        </p:spPr>
         <p:txBody>
           <a:bodyPr>
-            <a:normAutofit fontScale="85000" lnSpcReduction="10000"/>
+            <a:normAutofit/>
           </a:bodyPr>
           <a:lstStyle/>
           <a:p>
-            <a:pPr algn="just">
+            <a:pPr marL="0" indent="0" algn="just">
               <a:lnSpc>
                 <a:spcPct val="150000"/>
               </a:lnSpc>
+              <a:buNone/>
             </a:pPr>
             <a:r>
-              <a:rPr lang="en-US" sz="1800" dirty="0">
+              <a:rPr lang="en-US" sz="1600" dirty="0">
                 <a:effectLst/>
                 <a:latin typeface="Times New Roman" panose="02020603050405020304" pitchFamily="18" charset="0"/>
                 <a:ea typeface="SimSun" panose="02010600030101010101" pitchFamily="2" charset="-122"/>
               </a:rPr>
-              <a:t>In conclusion, while conventional methodologies often fall short in fostering profitability within commercial enterprises, the integration of machine learning approaches emerges as a pivotal solution for crafting robust business strategies. By leveraging machine learning algorithms, organizations can meticulously analyze various factors influencing branch profitability and inform the development of comprehensive business plans. Instead of focusing solely on traditional metrics, this entails discerning factors such as branch income, expenses, number of workers, and historical performance to classify branch profitability and establish achievable targets. Through the utilization of historical data and pertinent factors, businesses can adeptly forecast profitability and set actionable targets. This informed approach enables enterprises to implement effective strategies, fostering sustainable growth and facilitating their success in competitive markets with confidence and agility.</a:t>
-            </a:r>
-            <a:endParaRPr lang="en-IN" sz="1800" dirty="0">
-              <a:effectLst/>
-              <a:latin typeface="Times New Roman" panose="02020603050405020304" pitchFamily="18" charset="0"/>
-              <a:ea typeface="SimSun" panose="02010600030101010101" pitchFamily="2" charset="-122"/>
-            </a:endParaRPr>
-          </a:p>
-          <a:p>
-            <a:pPr algn="just"/>
-            <a:endParaRPr lang="en-IN" sz="1800" dirty="0">
-              <a:effectLst/>
-              <a:latin typeface="Times New Roman" panose="02020603050405020304" pitchFamily="18" charset="0"/>
-              <a:ea typeface="SimSun" panose="02010600030101010101" pitchFamily="2" charset="-122"/>
-            </a:endParaRPr>
-          </a:p>
-          <a:p>
-            <a:endParaRPr lang="en-IN" dirty="0"/>
+              <a:t>In summary, the integration of machine learning techniques offers a transformative approach to branch account management, enabling organizations to optimize profitability and strategic planning. Through the analysis of key factors such as income, expenses, and workforce size, businesses can effectively classify branches and establish realistic targets. This data-driven approach facilitates informed decision-making, fosters sustainable growth, and empowers enterprises to navigate competitive markets with confidence and adaptability. By harnessing the power of machine learning, organizations can gain valuable insights to drive operational efficiency and achieve long-term success in the dynamic business landscape.</a:t>
+            </a:r>
+            <a:endParaRPr lang="en-IN" sz="1600" dirty="0"/>
           </a:p>
         </p:txBody>
       </p:sp>
@@ -16470,8 +16499,8 @@
         </p:nvSpPr>
         <p:spPr>
           <a:xfrm>
-            <a:off x="158620" y="1922106"/>
-            <a:ext cx="11625943" cy="4133461"/>
+            <a:off x="587829" y="1922106"/>
+            <a:ext cx="11206065" cy="4133461"/>
           </a:xfrm>
         </p:spPr>
         <p:txBody>
@@ -16487,18 +16516,10 @@
               <a:buNone/>
             </a:pPr>
             <a:r>
-              <a:rPr lang="en-US" sz="3400" dirty="0">
-                <a:effectLst/>
-                <a:latin typeface="Times New Roman" panose="02020603050405020304" pitchFamily="18" charset="0"/>
-                <a:ea typeface="SimSun" panose="02010600030101010101" pitchFamily="2" charset="-122"/>
-              </a:rPr>
+              <a:rPr lang="en-US" dirty="0"/>
               <a:t> </a:t>
             </a:r>
-            <a:endParaRPr lang="en-IN" sz="3400" dirty="0">
-              <a:effectLst/>
-              <a:latin typeface="Times New Roman" panose="02020603050405020304" pitchFamily="18" charset="0"/>
-              <a:ea typeface="SimSun" panose="02010600030101010101" pitchFamily="2" charset="-122"/>
-            </a:endParaRPr>
+            <a:endParaRPr lang="en-IN" dirty="0"/>
           </a:p>
           <a:p>
             <a:pPr algn="just">
@@ -16516,59 +16537,19 @@
               </a:tabLst>
             </a:pPr>
             <a:r>
-              <a:rPr lang="en-US" sz="1600" dirty="0">
-                <a:effectLst/>
-                <a:latin typeface="Times New Roman" panose="02020603050405020304" pitchFamily="18" charset="0"/>
-                <a:ea typeface="MS Mincho" panose="02020609040205080304" pitchFamily="49" charset="-128"/>
-              </a:rPr>
-              <a:t>W. </a:t>
-            </a:r>
-            <a:r>
-              <a:rPr lang="en-US" sz="1600" dirty="0" err="1">
-                <a:effectLst/>
-                <a:latin typeface="Times New Roman" panose="02020603050405020304" pitchFamily="18" charset="0"/>
-                <a:ea typeface="MS Mincho" panose="02020609040205080304" pitchFamily="49" charset="-128"/>
-              </a:rPr>
-              <a:t>Zhengjun</a:t>
-            </a:r>
-            <a:r>
-              <a:rPr lang="en-US" sz="1600" dirty="0">
-                <a:effectLst/>
-                <a:latin typeface="Times New Roman" panose="02020603050405020304" pitchFamily="18" charset="0"/>
-                <a:ea typeface="MS Mincho" panose="02020609040205080304" pitchFamily="49" charset="-128"/>
-              </a:rPr>
-              <a:t>, D. </a:t>
-            </a:r>
-            <a:r>
-              <a:rPr lang="en-US" sz="1600" dirty="0" err="1">
-                <a:effectLst/>
-                <a:latin typeface="Times New Roman" panose="02020603050405020304" pitchFamily="18" charset="0"/>
-                <a:ea typeface="MS Mincho" panose="02020609040205080304" pitchFamily="49" charset="-128"/>
-              </a:rPr>
-              <a:t>Zhiting</a:t>
-            </a:r>
-            <a:r>
-              <a:rPr lang="en-US" sz="1600" dirty="0">
-                <a:effectLst/>
-                <a:latin typeface="Times New Roman" panose="02020603050405020304" pitchFamily="18" charset="0"/>
-                <a:ea typeface="MS Mincho" panose="02020609040205080304" pitchFamily="49" charset="-128"/>
-              </a:rPr>
-              <a:t> and D. Na, "Strategies for Optimizing the Application Environment of Management Accounting in Commercial Banks," 2021 International Conference on Public Management and Intelligent Society (PMIS), Shanghai, China, 2021, pp. 345-349, </a:t>
-            </a:r>
-            <a:r>
-              <a:rPr lang="en-US" sz="1600" dirty="0" err="1">
-                <a:effectLst/>
-                <a:latin typeface="Times New Roman" panose="02020603050405020304" pitchFamily="18" charset="0"/>
-                <a:ea typeface="MS Mincho" panose="02020609040205080304" pitchFamily="49" charset="-128"/>
-              </a:rPr>
-              <a:t>doi</a:t>
-            </a:r>
-            <a:r>
-              <a:rPr lang="en-US" sz="1600" dirty="0">
-                <a:effectLst/>
-                <a:latin typeface="Times New Roman" panose="02020603050405020304" pitchFamily="18" charset="0"/>
-                <a:ea typeface="MS Mincho" panose="02020609040205080304" pitchFamily="49" charset="-128"/>
-              </a:rPr>
+              <a:rPr lang="en-US"/>
+              <a:t>W. Zhengjun, D. Zhiting</a:t>
+            </a:r>
+            <a:r>
+              <a:rPr lang="en-US" dirty="0"/>
+              <a:t> and D. Na, "Strategies for Optimizing the Application Environment of Management Accounting in Commercial Banks," 2021 International Conference on Public Management and Intelligent Society (PMIS), Shanghai, China, 2021, pp</a:t>
+            </a:r>
+            <a:r>
+              <a:rPr lang="en-US"/>
+              <a:t>. 345-349, doi</a:t>
+            </a:r>
+            <a:r>
+              <a:rPr lang="en-US" dirty="0"/>
               <a:t>: 10.1109/PMIS52742.2021.00084. </a:t>
             </a:r>
           </a:p>
@@ -16588,66 +16569,34 @@
               </a:tabLst>
             </a:pPr>
             <a:r>
-              <a:rPr lang="en-US" sz="1600" dirty="0">
-                <a:effectLst/>
-                <a:latin typeface="Times New Roman" panose="02020603050405020304" pitchFamily="18" charset="0"/>
-                <a:ea typeface="MS Mincho" panose="02020609040205080304" pitchFamily="49" charset="-128"/>
-              </a:rPr>
-              <a:t> H. D. </a:t>
-            </a:r>
-            <a:r>
-              <a:rPr lang="en-US" sz="1600" dirty="0" err="1">
-                <a:effectLst/>
-                <a:latin typeface="Times New Roman" panose="02020603050405020304" pitchFamily="18" charset="0"/>
-                <a:ea typeface="MS Mincho" panose="02020609040205080304" pitchFamily="49" charset="-128"/>
-              </a:rPr>
-              <a:t>Narudin</a:t>
-            </a:r>
-            <a:r>
-              <a:rPr lang="en-US" sz="1600" dirty="0">
-                <a:effectLst/>
-                <a:latin typeface="Times New Roman" panose="02020603050405020304" pitchFamily="18" charset="0"/>
-                <a:ea typeface="MS Mincho" panose="02020609040205080304" pitchFamily="49" charset="-128"/>
-              </a:rPr>
-              <a:t>, U. Subramanian and F. Kawi, "The Effectiveness of Management Accounting Systems in Brunei Small  and Medium Enterprises," 2022 International Conference on Information Management and Technology (</a:t>
-            </a:r>
-            <a:r>
-              <a:rPr lang="en-US" sz="1600" dirty="0" err="1">
-                <a:effectLst/>
-                <a:latin typeface="Times New Roman" panose="02020603050405020304" pitchFamily="18" charset="0"/>
-                <a:ea typeface="MS Mincho" panose="02020609040205080304" pitchFamily="49" charset="-128"/>
-              </a:rPr>
-              <a:t>ICIMTech</a:t>
-            </a:r>
-            <a:r>
-              <a:rPr lang="en-US" sz="1600" dirty="0">
-                <a:effectLst/>
-                <a:latin typeface="Times New Roman" panose="02020603050405020304" pitchFamily="18" charset="0"/>
-                <a:ea typeface="MS Mincho" panose="02020609040205080304" pitchFamily="49" charset="-128"/>
-              </a:rPr>
-              <a:t>), Semarang, Indonesia, 2022, pp. 155-160, </a:t>
-            </a:r>
-            <a:r>
-              <a:rPr lang="en-US" sz="1600" dirty="0" err="1">
-                <a:effectLst/>
-                <a:latin typeface="Times New Roman" panose="02020603050405020304" pitchFamily="18" charset="0"/>
-                <a:ea typeface="MS Mincho" panose="02020609040205080304" pitchFamily="49" charset="-128"/>
-              </a:rPr>
-              <a:t>doi</a:t>
-            </a:r>
-            <a:r>
-              <a:rPr lang="en-US" sz="1600" dirty="0">
-                <a:effectLst/>
-                <a:latin typeface="Times New Roman" panose="02020603050405020304" pitchFamily="18" charset="0"/>
-                <a:ea typeface="MS Mincho" panose="02020609040205080304" pitchFamily="49" charset="-128"/>
-              </a:rPr>
+              <a:rPr lang="en-US" dirty="0"/>
+              <a:t> H</a:t>
+            </a:r>
+            <a:r>
+              <a:rPr lang="en-US"/>
+              <a:t>. D. Narudin</a:t>
+            </a:r>
+            <a:r>
+              <a:rPr lang="en-US" dirty="0"/>
+              <a:t>, U. Subramanian and F. Kawi, "The Effectiveness of Management Accounting Systems in Brunei Small  and Medium Enterprises," 2022 International Conference on Information Management </a:t>
+            </a:r>
+            <a:r>
+              <a:rPr lang="en-US"/>
+              <a:t>and Technology (ICIMTech</a:t>
+            </a:r>
+            <a:r>
+              <a:rPr lang="en-US" dirty="0"/>
+              <a:t>), Semarang, Indonesia, 2022, pp</a:t>
+            </a:r>
+            <a:r>
+              <a:rPr lang="en-US"/>
+              <a:t>. 155-160, doi</a:t>
+            </a:r>
+            <a:r>
+              <a:rPr lang="en-US" dirty="0"/>
               <a:t>: 10.1109/ICIMTech55957.2022.9915080 </a:t>
             </a:r>
-            <a:endParaRPr lang="en-IN" sz="1600" dirty="0">
-              <a:effectLst/>
-              <a:latin typeface="Times New Roman" panose="02020603050405020304" pitchFamily="18" charset="0"/>
-              <a:ea typeface="MS Mincho" panose="02020609040205080304" pitchFamily="49" charset="-128"/>
-            </a:endParaRPr>
+            <a:endParaRPr lang="en-IN" dirty="0"/>
           </a:p>
           <a:p>
             <a:pPr marL="0" indent="0" algn="just">
@@ -16663,11 +16612,7 @@
                 <a:tab pos="457200" algn="l"/>
               </a:tabLst>
             </a:pPr>
-            <a:endParaRPr lang="en-IN" sz="1800" dirty="0">
-              <a:effectLst/>
-              <a:latin typeface="Times New Roman" panose="02020603050405020304" pitchFamily="18" charset="0"/>
-              <a:ea typeface="MS Mincho" panose="02020609040205080304" pitchFamily="49" charset="-128"/>
-            </a:endParaRPr>
+            <a:endParaRPr lang="en-IN" dirty="0"/>
           </a:p>
           <a:p>
             <a:pPr>
@@ -18048,39 +17993,7 @@
                 <a:latin typeface="Times New Roman" panose="02020603050405020304" pitchFamily="18" charset="0"/>
                 <a:ea typeface="SimSun" panose="02010600030101010101" pitchFamily="2" charset="-122"/>
               </a:rPr>
-              <a:t>I. Met, A. </a:t>
-            </a:r>
-            <a:r>
-              <a:rPr lang="en-US" sz="1800" dirty="0" err="1">
-                <a:effectLst/>
-                <a:latin typeface="Times New Roman" panose="02020603050405020304" pitchFamily="18" charset="0"/>
-                <a:ea typeface="SimSun" panose="02010600030101010101" pitchFamily="2" charset="-122"/>
-              </a:rPr>
-              <a:t>Erkoç</a:t>
-            </a:r>
-            <a:r>
-              <a:rPr lang="en-US" sz="1800" dirty="0">
-                <a:effectLst/>
-                <a:latin typeface="Times New Roman" panose="02020603050405020304" pitchFamily="18" charset="0"/>
-                <a:ea typeface="SimSun" panose="02010600030101010101" pitchFamily="2" charset="-122"/>
-              </a:rPr>
-              <a:t> and S. E. </a:t>
-            </a:r>
-            <a:r>
-              <a:rPr lang="en-US" sz="1800" dirty="0" err="1">
-                <a:effectLst/>
-                <a:latin typeface="Times New Roman" panose="02020603050405020304" pitchFamily="18" charset="0"/>
-                <a:ea typeface="SimSun" panose="02010600030101010101" pitchFamily="2" charset="-122"/>
-              </a:rPr>
-              <a:t>Seker</a:t>
-            </a:r>
-            <a:r>
-              <a:rPr lang="en-US" sz="1800" dirty="0">
-                <a:effectLst/>
-                <a:latin typeface="Times New Roman" panose="02020603050405020304" pitchFamily="18" charset="0"/>
-                <a:ea typeface="SimSun" panose="02010600030101010101" pitchFamily="2" charset="-122"/>
-              </a:rPr>
-              <a:t> et al. [1] Setting targets and distributing them to bank branches and portfolio managers is crucial for strategic planning. This study focuses on predicting performance using machine learning algorithms, achieving 98% accuracy. The approach, applied at </a:t>
+              <a:t>I. Met et al. [1] Setting targets and distributing them to bank branches and portfolio managers is crucial for strategic planning. This study focuses on predicting performance using machine learning algorithms, achieving 98% accuracy. The approach, applied at </a:t>
             </a:r>
             <a:r>
               <a:rPr lang="en-US" sz="1800" dirty="0" err="1">
@@ -18112,7 +18025,7 @@
                 <a:latin typeface="Times New Roman" panose="02020603050405020304" pitchFamily="18" charset="0"/>
                 <a:ea typeface="SimSun" panose="02010600030101010101" pitchFamily="2" charset="-122"/>
               </a:rPr>
-              <a:t>C.A. Knox Lovell, Jesús T. Pastor et al. [2] This paper evaluates the target setting process in a Spanish financial institution. It assesses branch performance against set targets and suggests reducing the target list without losing vital information. This streamlined approach enhances management evaluation of branch performance.</a:t>
+              <a:t>C.A. Knox Lovell et al. [2] This paper evaluates the target setting process in a Spanish financial institution. It assesses branch performance against set targets and suggests reducing the target list without losing vital information. This streamlined approach enhances management evaluation of branch performance.</a:t>
             </a:r>
           </a:p>
           <a:p>
@@ -18312,25 +18225,7 @@
                 <a:ea typeface="SimSun" panose="02010600030101010101" pitchFamily="2" charset="-122"/>
                 <a:cs typeface="Times New Roman" panose="02020603050405020304" pitchFamily="18" charset="0"/>
               </a:rPr>
-              <a:t>, D. </a:t>
-            </a:r>
-            <a:r>
-              <a:rPr lang="en-US" sz="1800" dirty="0" err="1">
-                <a:effectLst/>
-                <a:latin typeface="Times New Roman" panose="02020603050405020304" pitchFamily="18" charset="0"/>
-                <a:ea typeface="SimSun" panose="02010600030101010101" pitchFamily="2" charset="-122"/>
-                <a:cs typeface="Times New Roman" panose="02020603050405020304" pitchFamily="18" charset="0"/>
-              </a:rPr>
-              <a:t>Zhiting</a:t>
-            </a:r>
-            <a:r>
-              <a:rPr lang="en-US" sz="1800" dirty="0">
-                <a:effectLst/>
-                <a:latin typeface="Times New Roman" panose="02020603050405020304" pitchFamily="18" charset="0"/>
-                <a:ea typeface="SimSun" panose="02010600030101010101" pitchFamily="2" charset="-122"/>
-                <a:cs typeface="Times New Roman" panose="02020603050405020304" pitchFamily="18" charset="0"/>
-              </a:rPr>
-              <a:t>, and D. Na et al. [5] This paper examines strategies for optimizing the application environment of management accounting in commercial banks.  Despite the importance of management    accounting in modern enterprise management, its application in Chinese enterprises faces challenges, leading to suboptimal application environments. The study analyzes these challenges and proposes counter measures to enhance the application of management accounting in commercial banks, aiming to a drive progress and development in this area.</a:t>
+              <a:t> et al. [4] This paper examines strategies for optimizing the application environment of management accounting in commercial banks.  Despite the importance of management    accounting in modern enterprise management, its application in Chinese enterprises faces challenges, leading to suboptimal application environments. The study analyzes these challenges and proposes counter measures to enhance the application of management accounting in commercial banks, aiming to a drive progress and development in this area.</a:t>
             </a:r>
             <a:endParaRPr lang="en-US" dirty="0">
               <a:latin typeface="Times New Roman" panose="02020603050405020304" pitchFamily="18" charset="0"/>
@@ -18366,12 +18261,19 @@
               <a:t>Narudin</a:t>
             </a:r>
             <a:r>
+              <a:rPr lang="en-US" dirty="0">
+                <a:latin typeface="Times New Roman" panose="02020603050405020304" pitchFamily="18" charset="0"/>
+                <a:ea typeface="SimSun" panose="02010600030101010101" pitchFamily="2" charset="-122"/>
+              </a:rPr>
+              <a:t> </a:t>
+            </a:r>
+            <a:r>
               <a:rPr lang="en-US" sz="1800" dirty="0">
                 <a:effectLst/>
                 <a:latin typeface="Times New Roman" panose="02020603050405020304" pitchFamily="18" charset="0"/>
                 <a:ea typeface="SimSun" panose="02010600030101010101" pitchFamily="2" charset="-122"/>
               </a:rPr>
-              <a:t>, U. Subramanian, and F. Kawi et al. [6] This study investigates the effectiveness of management accounting systems in Brunei's Small and Medium Enterprises (SMEs). By analyzing responses from 250 participants, the study explores how management accounting influences decision-making processes and aids in achieving business goals within the context of SMEs in Brunei.</a:t>
+              <a:t>et al. [5] This study investigates the effectiveness of management accounting systems in Brunei's Small and Medium Enterprises (SMEs). By analyzing responses from 250 participants, the study explores how management accounting influences decision-making processes and aids in achieving business goals within the context of SMEs in Brunei.</a:t>
             </a:r>
             <a:endParaRPr lang="en-IN" sz="1800" dirty="0">
               <a:effectLst/>
@@ -19335,42 +19237,6 @@
       </p:pic>
       <p:pic>
         <p:nvPicPr>
-          <p:cNvPr id="21" name="Picture 20">
-            <a:extLst>
-              <a:ext uri="{FF2B5EF4-FFF2-40B4-BE49-F238E27FC236}">
-                <a16:creationId xmlns:a16="http://schemas.microsoft.com/office/drawing/2014/main" id="{1B2CB5EB-CB45-6313-4063-AC76D9282C69}"/>
-              </a:ext>
-            </a:extLst>
-          </p:cNvPr>
-          <p:cNvPicPr>
-            <a:picLocks noChangeAspect="1"/>
-          </p:cNvPicPr>
-          <p:nvPr/>
-        </p:nvPicPr>
-        <p:blipFill>
-          <a:blip r:embed="rId3" cstate="print">
-            <a:extLst>
-              <a:ext uri="{28A0092B-C50C-407E-A947-70E740481C1C}">
-                <a14:useLocalDpi xmlns:a14="http://schemas.microsoft.com/office/drawing/2010/main" val="0"/>
-              </a:ext>
-            </a:extLst>
-          </a:blip>
-          <a:stretch>
-            <a:fillRect/>
-          </a:stretch>
-        </p:blipFill>
-        <p:spPr>
-          <a:xfrm>
-            <a:off x="853632" y="1085956"/>
-            <a:ext cx="7505659" cy="1380511"/>
-          </a:xfrm>
-          <a:prstGeom prst="rect">
-            <a:avLst/>
-          </a:prstGeom>
-        </p:spPr>
-      </p:pic>
-      <p:pic>
-        <p:nvPicPr>
           <p:cNvPr id="22" name="Picture 21">
             <a:extLst>
               <a:ext uri="{FF2B5EF4-FFF2-40B4-BE49-F238E27FC236}">
@@ -19384,7 +19250,7 @@
           <p:nvPr/>
         </p:nvPicPr>
         <p:blipFill>
-          <a:blip r:embed="rId4"/>
+          <a:blip r:embed="rId3"/>
           <a:stretch>
             <a:fillRect/>
           </a:stretch>
@@ -19414,7 +19280,7 @@
           <p:nvPr/>
         </p:nvPicPr>
         <p:blipFill>
-          <a:blip r:embed="rId5"/>
+          <a:blip r:embed="rId4"/>
           <a:stretch>
             <a:fillRect/>
           </a:stretch>
@@ -19444,7 +19310,7 @@
           <p:nvPr/>
         </p:nvPicPr>
         <p:blipFill>
-          <a:blip r:embed="rId6"/>
+          <a:blip r:embed="rId5"/>
           <a:stretch>
             <a:fillRect/>
           </a:stretch>
@@ -19453,6 +19319,36 @@
           <a:xfrm>
             <a:off x="977419" y="5403251"/>
             <a:ext cx="5186134" cy="600234"/>
+          </a:xfrm>
+          <a:prstGeom prst="rect">
+            <a:avLst/>
+          </a:prstGeom>
+        </p:spPr>
+      </p:pic>
+      <p:pic>
+        <p:nvPicPr>
+          <p:cNvPr id="7" name="Picture 6">
+            <a:extLst>
+              <a:ext uri="{FF2B5EF4-FFF2-40B4-BE49-F238E27FC236}">
+                <a16:creationId xmlns:a16="http://schemas.microsoft.com/office/drawing/2014/main" id="{2282F05F-5A67-F667-6CBC-9315F7ED228D}"/>
+              </a:ext>
+            </a:extLst>
+          </p:cNvPr>
+          <p:cNvPicPr>
+            <a:picLocks noChangeAspect="1"/>
+          </p:cNvPicPr>
+          <p:nvPr/>
+        </p:nvPicPr>
+        <p:blipFill>
+          <a:blip r:embed="rId6"/>
+          <a:stretch>
+            <a:fillRect/>
+          </a:stretch>
+        </p:blipFill>
+        <p:spPr>
+          <a:xfrm>
+            <a:off x="897146" y="1029493"/>
+            <a:ext cx="7569110" cy="1462011"/>
           </a:xfrm>
           <a:prstGeom prst="rect">
             <a:avLst/>
@@ -19559,7 +19455,14 @@
                 <a:latin typeface="Times New Roman" panose="02020603050405020304" pitchFamily="18" charset="0"/>
                 <a:ea typeface="SimSun" panose="02010600030101010101" pitchFamily="2" charset="-122"/>
               </a:rPr>
-              <a:t>6.Evaluate the model using the R-squared matric</a:t>
+              <a:t>6.Evaluate the model </a:t>
+            </a:r>
+            <a:r>
+              <a:rPr lang="en-US" spc="-5" dirty="0">
+                <a:latin typeface="Times New Roman" panose="02020603050405020304" pitchFamily="18" charset="0"/>
+                <a:ea typeface="SimSun" panose="02010600030101010101" pitchFamily="2" charset="-122"/>
+              </a:rPr>
+              <a:t> by checking the accuracy of the model</a:t>
             </a:r>
             <a:endParaRPr lang="en-IN" sz="1800" spc="-5" dirty="0">
               <a:effectLst/>
@@ -19770,10 +19673,10 @@
       </p:pic>
       <p:pic>
         <p:nvPicPr>
-          <p:cNvPr id="7" name="Picture 6">
+          <p:cNvPr id="11" name="Picture 10">
             <a:extLst>
               <a:ext uri="{FF2B5EF4-FFF2-40B4-BE49-F238E27FC236}">
-                <a16:creationId xmlns:a16="http://schemas.microsoft.com/office/drawing/2014/main" id="{B764BAD0-2385-F242-9B88-921D840E81C7}"/>
+                <a16:creationId xmlns:a16="http://schemas.microsoft.com/office/drawing/2014/main" id="{5C1DD58B-1416-1C04-3D5E-2626A74E1224}"/>
               </a:ext>
             </a:extLst>
           </p:cNvPr>
@@ -19790,8 +19693,8 @@
         </p:blipFill>
         <p:spPr>
           <a:xfrm>
-            <a:off x="768945" y="4461146"/>
-            <a:ext cx="5987320" cy="289846"/>
+            <a:off x="836283" y="4323696"/>
+            <a:ext cx="6385611" cy="293456"/>
           </a:xfrm>
           <a:prstGeom prst="rect">
             <a:avLst/>

</xml_diff>